<commit_message>
Update docs/HARRISONMARCKS14024424 - Six Sigma.pptx
</commit_message>
<xml_diff>
--- a/docs/HARRISONMARCKS14024424 - Six Sigma.pptx
+++ b/docs/HARRISONMARCKS14024424 - Six Sigma.pptx
@@ -119,6 +119,11 @@
       </a:defRPr>
     </a:lvl9pPr>
   </p:defaultTextStyle>
+  <p:extLst>
+    <p:ext uri="{EFAFB233-063F-42B5-8137-9DF3F51BA10A}">
+      <p15:sldGuideLst xmlns:p15="http://schemas.microsoft.com/office/powerpoint/2012/main"/>
+    </p:ext>
+  </p:extLst>
 </p:presentation>
 </file>
 
@@ -638,6 +643,58 @@
                 <a:cs typeface="+mn-cs"/>
               </a:rPr>
               <a:t> of a more expensive measure that helps to achieve Six Sigma, but adversely affects profitability.</a:t>
+            </a:r>
+          </a:p>
+          <a:p>
+            <a:r>
+              <a:rPr lang="en-GB" sz="1200" b="0" i="0" kern="1200" dirty="0">
+                <a:solidFill>
+                  <a:schemeClr val="tx1"/>
+                </a:solidFill>
+                <a:effectLst/>
+                <a:latin typeface="+mn-lt"/>
+                <a:ea typeface="+mn-ea"/>
+                <a:cs typeface="+mn-cs"/>
+              </a:rPr>
+              <a:t>customers deserve </a:t>
+            </a:r>
+            <a:r>
+              <a:rPr lang="en-GB" sz="1200" b="0" i="0" u="none" strike="noStrike" kern="1200" dirty="0">
+                <a:solidFill>
+                  <a:schemeClr val="tx1"/>
+                </a:solidFill>
+                <a:effectLst/>
+                <a:latin typeface="+mn-lt"/>
+                <a:ea typeface="+mn-ea"/>
+                <a:cs typeface="+mn-cs"/>
+                <a:hlinkClick r:id="rId3" tooltip="Zero Defects"/>
+              </a:rPr>
+              <a:t>defect-free products every time</a:t>
+            </a:r>
+            <a:r>
+              <a:rPr lang="en-GB" sz="1200" b="0" i="0" kern="1200" dirty="0">
+                <a:solidFill>
+                  <a:schemeClr val="tx1"/>
+                </a:solidFill>
+                <a:effectLst/>
+                <a:latin typeface="+mn-lt"/>
+                <a:ea typeface="+mn-ea"/>
+                <a:cs typeface="+mn-cs"/>
+              </a:rPr>
+              <a:t>. For example, under the Six Sigma standard, semiconductors which require the flawless etching of millions of tiny circuits onto a single chip are all defective, he claims.</a:t>
+            </a:r>
+            <a:r>
+              <a:rPr lang="en-GB" sz="1200" b="0" i="0" u="none" strike="noStrike" kern="1200" baseline="30000" dirty="0">
+                <a:solidFill>
+                  <a:schemeClr val="tx1"/>
+                </a:solidFill>
+                <a:effectLst/>
+                <a:latin typeface="+mn-lt"/>
+                <a:ea typeface="+mn-ea"/>
+                <a:cs typeface="+mn-cs"/>
+                <a:hlinkClick r:id="rId4"/>
+              </a:rPr>
+              <a:t>[30]</a:t>
             </a:r>
             <a:endParaRPr lang="en-GB" dirty="0"/>
           </a:p>
@@ -16155,7 +16212,7 @@
         </p:spPr>
         <p:txBody>
           <a:bodyPr vert="horz" lIns="91440" tIns="45720" rIns="91440" bIns="45720" rtlCol="0">
-            <a:normAutofit/>
+            <a:normAutofit fontScale="85000" lnSpcReduction="10000"/>
           </a:bodyPr>
           <a:lstStyle>
             <a:lvl1pPr marL="228600" indent="-228600" algn="l" defTabSz="914400" rtl="0" eaLnBrk="1" latinLnBrk="0" hangingPunct="1">
@@ -16428,6 +16485,34 @@
             <a:r>
               <a:rPr lang="en-GB" dirty="0"/>
               <a:t>Relatively limited to safety critical systems</a:t>
+            </a:r>
+          </a:p>
+          <a:p>
+            <a:pPr lvl="1"/>
+            <a:r>
+              <a:rPr lang="en-GB" dirty="0"/>
+              <a:t>Systematic academic documentation is poor</a:t>
+            </a:r>
+          </a:p>
+          <a:p>
+            <a:pPr lvl="1"/>
+            <a:r>
+              <a:rPr lang="en-GB" dirty="0"/>
+              <a:t>Is really limited to existing processes</a:t>
+            </a:r>
+          </a:p>
+          <a:p>
+            <a:pPr lvl="1"/>
+            <a:r>
+              <a:rPr lang="en-GB" dirty="0"/>
+              <a:t>Doesn’t go far enough for complex manufacturing</a:t>
+            </a:r>
+          </a:p>
+          <a:p>
+            <a:pPr lvl="1"/>
+            <a:r>
+              <a:rPr lang="en-GB" dirty="0"/>
+              <a:t>Is largely unoriginal</a:t>
             </a:r>
           </a:p>
           <a:p>

</xml_diff>